<commit_message>
What is Spring Boot?
</commit_message>
<xml_diff>
--- a/15_Ch01_Intro.pptx
+++ b/15_Ch01_Intro.pptx
@@ -3778,9 +3778,12 @@
           <a:lstStyle/>
           <a:p>
             <a:r>
-              <a:rPr lang="en-US" altLang="zh-TW" sz="1600" b="1" i="1" dirty="0"/>
-              <a:t>https://www.youtube.com/watch?v=E7_a-kB46LU&amp;list=PLqq-6Pq4lTTbx8p2oCgcAQGQyqN8XeA1x&amp;index=9</a:t>
-            </a:r>
+              <a:rPr lang="en-US" sz="1600">
+                <a:hlinkClick r:id="rId2"/>
+              </a:rPr>
+              <a:t>https://www.youtube.com/watch?v=msXL2oDexqw&amp;list=PLqq-6Pq4lTTbx8p2oCgcAQGQyqN8XeA1x&amp;index=1</a:t>
+            </a:r>
+            <a:endParaRPr lang="en-US" altLang="zh-TW" sz="1600" b="1" i="1" dirty="0"/>
           </a:p>
         </p:txBody>
       </p:sp>
@@ -3857,7 +3860,7 @@
           <p:nvPr/>
         </p:nvPicPr>
         <p:blipFill>
-          <a:blip r:embed="rId2"/>
+          <a:blip r:embed="rId3"/>
           <a:stretch>
             <a:fillRect/>
           </a:stretch>
@@ -4239,9 +4242,12 @@
           <a:lstStyle/>
           <a:p>
             <a:r>
-              <a:rPr lang="en-US" altLang="zh-TW" sz="1600" b="1" i="1" dirty="0"/>
-              <a:t>https://www.youtube.com/watch?v=E7_a-kB46LU&amp;list=PLqq-6Pq4lTTbx8p2oCgcAQGQyqN8XeA1x&amp;index=9</a:t>
-            </a:r>
+              <a:rPr lang="en-US" sz="1600" dirty="0">
+                <a:hlinkClick r:id="rId2"/>
+              </a:rPr>
+              <a:t>https://www.youtube.com/watch?v=msXL2oDexqw&amp;list=PLqq-6Pq4lTTbx8p2oCgcAQGQyqN8XeA1x&amp;index=1</a:t>
+            </a:r>
+            <a:endParaRPr lang="en-US" altLang="zh-TW" sz="1600" b="1" i="1" dirty="0"/>
           </a:p>
         </p:txBody>
       </p:sp>
@@ -4318,7 +4324,7 @@
           <p:nvPr/>
         </p:nvPicPr>
         <p:blipFill>
-          <a:blip r:embed="rId2"/>
+          <a:blip r:embed="rId3"/>
           <a:stretch>
             <a:fillRect/>
           </a:stretch>

</xml_diff>